<commit_message>
Add dehydration documentation.  Add new scenario for drinking salt water after dehydration. Updates to dehydration validation.
</commit_message>
<xml_diff>
--- a/docs/Figures/TissueWorking.pptx
+++ b/docs/Figures/TissueWorking.pptx
@@ -6,13 +6,14 @@
     <p:sldMasterId id="2147483672" r:id="rId2"/>
   </p:sldMasterIdLst>
   <p:notesMasterIdLst>
-    <p:notesMasterId r:id="rId7"/>
+    <p:notesMasterId r:id="rId8"/>
   </p:notesMasterIdLst>
   <p:sldIdLst>
     <p:sldId id="268" r:id="rId3"/>
     <p:sldId id="269" r:id="rId4"/>
     <p:sldId id="270" r:id="rId5"/>
     <p:sldId id="271" r:id="rId6"/>
+    <p:sldId id="272" r:id="rId7"/>
   </p:sldIdLst>
   <p:sldSz cx="9144000" cy="6858000" type="screen4x3"/>
   <p:notesSz cx="6996113" cy="9282113"/>
@@ -212,7 +213,7 @@
           <a:p>
             <a:fld id="{7B126BB8-5932-4ACC-8CD5-328D9DA138C9}" type="datetimeFigureOut">
               <a:rPr lang="en-US" smtClean="0"/>
-              <a:t>1/7/2020</a:t>
+              <a:t>2/29/2024</a:t>
             </a:fld>
             <a:endParaRPr lang="en-US"/>
           </a:p>
@@ -658,7 +659,7 @@
           <a:p>
             <a:fld id="{9E9AFD63-10BD-4598-9E1E-9FFECB76D2D7}" type="datetimeFigureOut">
               <a:rPr lang="en-US" smtClean="0"/>
-              <a:t>1/7/2020</a:t>
+              <a:t>2/29/2024</a:t>
             </a:fld>
             <a:endParaRPr lang="en-US"/>
           </a:p>
@@ -826,7 +827,7 @@
           <a:p>
             <a:fld id="{9E9AFD63-10BD-4598-9E1E-9FFECB76D2D7}" type="datetimeFigureOut">
               <a:rPr lang="en-US" smtClean="0"/>
-              <a:t>1/7/2020</a:t>
+              <a:t>2/29/2024</a:t>
             </a:fld>
             <a:endParaRPr lang="en-US"/>
           </a:p>
@@ -1004,7 +1005,7 @@
           <a:p>
             <a:fld id="{9E9AFD63-10BD-4598-9E1E-9FFECB76D2D7}" type="datetimeFigureOut">
               <a:rPr lang="en-US" smtClean="0"/>
-              <a:t>1/7/2020</a:t>
+              <a:t>2/29/2024</a:t>
             </a:fld>
             <a:endParaRPr lang="en-US"/>
           </a:p>
@@ -2759,7 +2760,7 @@
           <a:p>
             <a:fld id="{9E9AFD63-10BD-4598-9E1E-9FFECB76D2D7}" type="datetimeFigureOut">
               <a:rPr lang="en-US" smtClean="0"/>
-              <a:t>1/7/2020</a:t>
+              <a:t>2/29/2024</a:t>
             </a:fld>
             <a:endParaRPr lang="en-US"/>
           </a:p>
@@ -3203,7 +3204,7 @@
           <a:p>
             <a:fld id="{9E9AFD63-10BD-4598-9E1E-9FFECB76D2D7}" type="datetimeFigureOut">
               <a:rPr lang="en-US" smtClean="0"/>
-              <a:t>1/7/2020</a:t>
+              <a:t>2/29/2024</a:t>
             </a:fld>
             <a:endParaRPr lang="en-US"/>
           </a:p>
@@ -3488,7 +3489,7 @@
           <a:p>
             <a:fld id="{9E9AFD63-10BD-4598-9E1E-9FFECB76D2D7}" type="datetimeFigureOut">
               <a:rPr lang="en-US" smtClean="0"/>
-              <a:t>1/7/2020</a:t>
+              <a:t>2/29/2024</a:t>
             </a:fld>
             <a:endParaRPr lang="en-US"/>
           </a:p>
@@ -3907,7 +3908,7 @@
           <a:p>
             <a:fld id="{9E9AFD63-10BD-4598-9E1E-9FFECB76D2D7}" type="datetimeFigureOut">
               <a:rPr lang="en-US" smtClean="0"/>
-              <a:t>1/7/2020</a:t>
+              <a:t>2/29/2024</a:t>
             </a:fld>
             <a:endParaRPr lang="en-US"/>
           </a:p>
@@ -4024,7 +4025,7 @@
           <a:p>
             <a:fld id="{9E9AFD63-10BD-4598-9E1E-9FFECB76D2D7}" type="datetimeFigureOut">
               <a:rPr lang="en-US" smtClean="0"/>
-              <a:t>1/7/2020</a:t>
+              <a:t>2/29/2024</a:t>
             </a:fld>
             <a:endParaRPr lang="en-US"/>
           </a:p>
@@ -4119,7 +4120,7 @@
           <a:p>
             <a:fld id="{9E9AFD63-10BD-4598-9E1E-9FFECB76D2D7}" type="datetimeFigureOut">
               <a:rPr lang="en-US" smtClean="0"/>
-              <a:t>1/7/2020</a:t>
+              <a:t>2/29/2024</a:t>
             </a:fld>
             <a:endParaRPr lang="en-US"/>
           </a:p>
@@ -4394,7 +4395,7 @@
           <a:p>
             <a:fld id="{9E9AFD63-10BD-4598-9E1E-9FFECB76D2D7}" type="datetimeFigureOut">
               <a:rPr lang="en-US" smtClean="0"/>
-              <a:t>1/7/2020</a:t>
+              <a:t>2/29/2024</a:t>
             </a:fld>
             <a:endParaRPr lang="en-US"/>
           </a:p>
@@ -4646,7 +4647,7 @@
           <a:p>
             <a:fld id="{9E9AFD63-10BD-4598-9E1E-9FFECB76D2D7}" type="datetimeFigureOut">
               <a:rPr lang="en-US" smtClean="0"/>
-              <a:t>1/7/2020</a:t>
+              <a:t>2/29/2024</a:t>
             </a:fld>
             <a:endParaRPr lang="en-US"/>
           </a:p>
@@ -4857,7 +4858,7 @@
           <a:p>
             <a:fld id="{9E9AFD63-10BD-4598-9E1E-9FFECB76D2D7}" type="datetimeFigureOut">
               <a:rPr lang="en-US" smtClean="0"/>
-              <a:t>1/7/2020</a:t>
+              <a:t>2/29/2024</a:t>
             </a:fld>
             <a:endParaRPr lang="en-US"/>
           </a:p>
@@ -8491,6 +8492,83 @@
 </p:sld>
 </file>
 
+<file path=ppt/slides/slide5.xml><?xml version="1.0" encoding="utf-8"?>
+<p:sld xmlns:a="http://schemas.openxmlformats.org/drawingml/2006/main" xmlns:r="http://schemas.openxmlformats.org/officeDocument/2006/relationships" xmlns:p="http://schemas.openxmlformats.org/presentationml/2006/main">
+  <p:cSld>
+    <p:spTree>
+      <p:nvGrpSpPr>
+        <p:cNvPr id="1" name=""/>
+        <p:cNvGrpSpPr/>
+        <p:nvPr/>
+      </p:nvGrpSpPr>
+      <p:grpSpPr>
+        <a:xfrm>
+          <a:off x="0" y="0"/>
+          <a:ext cx="0" cy="0"/>
+          <a:chOff x="0" y="0"/>
+          <a:chExt cx="0" cy="0"/>
+        </a:xfrm>
+      </p:grpSpPr>
+      <p:pic>
+        <p:nvPicPr>
+          <p:cNvPr id="1026" name="Picture 2">
+            <a:extLst>
+              <a:ext uri="{FF2B5EF4-FFF2-40B4-BE49-F238E27FC236}">
+                <a16:creationId xmlns:a16="http://schemas.microsoft.com/office/drawing/2014/main" id="{F233E3C3-3C33-77B0-0203-36FB960D14B4}"/>
+              </a:ext>
+            </a:extLst>
+          </p:cNvPr>
+          <p:cNvPicPr>
+            <a:picLocks noChangeAspect="1" noChangeArrowheads="1"/>
+          </p:cNvPicPr>
+          <p:nvPr/>
+        </p:nvPicPr>
+        <p:blipFill>
+          <a:blip r:embed="rId2">
+            <a:extLst>
+              <a:ext uri="{28A0092B-C50C-407E-A947-70E740481C1C}">
+                <a14:useLocalDpi xmlns:a14="http://schemas.microsoft.com/office/drawing/2010/main" val="0"/>
+              </a:ext>
+            </a:extLst>
+          </a:blip>
+          <a:srcRect/>
+          <a:stretch>
+            <a:fillRect/>
+          </a:stretch>
+        </p:blipFill>
+        <p:spPr bwMode="auto">
+          <a:xfrm>
+            <a:off x="990600" y="1276350"/>
+            <a:ext cx="3229670" cy="1941238"/>
+          </a:xfrm>
+          <a:prstGeom prst="rect">
+            <a:avLst/>
+          </a:prstGeom>
+          <a:noFill/>
+          <a:extLst>
+            <a:ext uri="{909E8E84-426E-40DD-AFC4-6F175D3DCCD1}">
+              <a14:hiddenFill xmlns:a14="http://schemas.microsoft.com/office/drawing/2010/main">
+                <a:solidFill>
+                  <a:srgbClr val="FFFFFF"/>
+                </a:solidFill>
+              </a14:hiddenFill>
+            </a:ext>
+          </a:extLst>
+        </p:spPr>
+      </p:pic>
+    </p:spTree>
+    <p:extLst>
+      <p:ext uri="{BB962C8B-B14F-4D97-AF65-F5344CB8AC3E}">
+        <p14:creationId xmlns:p14="http://schemas.microsoft.com/office/powerpoint/2010/main" val="2244661102"/>
+      </p:ext>
+    </p:extLst>
+  </p:cSld>
+  <p:clrMapOvr>
+    <a:masterClrMapping/>
+  </p:clrMapOvr>
+</p:sld>
+</file>
+
 <file path=ppt/theme/theme1.xml><?xml version="1.0" encoding="utf-8"?>
 <a:theme xmlns:a="http://schemas.openxmlformats.org/drawingml/2006/main" name="Office Theme">
   <a:themeElements>

</xml_diff>